<commit_message>
Datensätze & AppDesigner Update
</commit_message>
<xml_diff>
--- a/MatlabKurs.pptx
+++ b/MatlabKurs.pptx
@@ -3733,7 +3733,7 @@
               <a:rPr lang="en-US" dirty="0" err="1"/>
               <a:t>Daten</a:t>
             </a:r>
-            <a:endParaRPr lang="de-DE" dirty="0"/>
+            <a:endParaRPr lang="en-US" dirty="0"/>
           </a:p>
         </p:txBody>
       </p:sp>
@@ -3879,6 +3879,13 @@
             <a:r>
               <a:rPr lang="en-US" dirty="0" err="1"/>
               <a:t>Plotten</a:t>
+            </a:r>
+            <a:endParaRPr lang="en-US" dirty="0"/>
+          </a:p>
+          <a:p>
+            <a:r>
+              <a:rPr lang="en-US" dirty="0" err="1"/>
+              <a:t>Funktionen</a:t>
             </a:r>
             <a:endParaRPr lang="en-US" dirty="0"/>
           </a:p>

</xml_diff>

<commit_message>
changes before the first weekend
</commit_message>
<xml_diff>
--- a/MatlabKurs.pptx
+++ b/MatlabKurs.pptx
@@ -371,7 +371,7 @@
           <a:p>
             <a:fld id="{4C3797C4-ED8E-4EA4-959C-2AEEE7E3AD08}" type="datetimeFigureOut">
               <a:rPr lang="de-DE" smtClean="0"/>
-              <a:t>05.05.2022</a:t>
+              <a:t>14.11.2022</a:t>
             </a:fld>
             <a:endParaRPr lang="de-DE"/>
           </a:p>
@@ -437,7 +437,7 @@
           <a:p>
             <a:fld id="{FBF1F910-8AA9-49D3-9D40-DBE35BDF9359}" type="slidenum">
               <a:rPr lang="de-DE" smtClean="0"/>
-              <a:t>‹Nr.›</a:t>
+              <a:t>‹#›</a:t>
             </a:fld>
             <a:endParaRPr lang="de-DE"/>
           </a:p>
@@ -536,7 +536,7 @@
           <a:p>
             <a:fld id="{44B5C22D-DB44-4084-9471-0EB64DB204F9}" type="datetimeFigureOut">
               <a:rPr lang="de-DE" smtClean="0"/>
-              <a:t>05.05.2022</a:t>
+              <a:t>14.11.2022</a:t>
             </a:fld>
             <a:endParaRPr lang="de-DE"/>
           </a:p>
@@ -694,7 +694,7 @@
           <a:p>
             <a:fld id="{8947F2EB-A273-4CA5-8E41-BC88C509E25D}" type="slidenum">
               <a:rPr lang="de-DE" smtClean="0"/>
-              <a:t>‹Nr.›</a:t>
+              <a:t>‹#›</a:t>
             </a:fld>
             <a:endParaRPr lang="de-DE"/>
           </a:p>
@@ -803,6 +803,295 @@
 </p:notesMaster>
 </file>
 
+<file path=ppt/notesSlides/notesSlide1.xml><?xml version="1.0" encoding="utf-8"?>
+<p:notes xmlns:a="http://schemas.openxmlformats.org/drawingml/2006/main" xmlns:r="http://schemas.openxmlformats.org/officeDocument/2006/relationships" xmlns:p="http://schemas.openxmlformats.org/presentationml/2006/main">
+  <p:cSld>
+    <p:spTree>
+      <p:nvGrpSpPr>
+        <p:cNvPr id="1" name=""/>
+        <p:cNvGrpSpPr/>
+        <p:nvPr/>
+      </p:nvGrpSpPr>
+      <p:grpSpPr>
+        <a:xfrm>
+          <a:off x="0" y="0"/>
+          <a:ext cx="0" cy="0"/>
+          <a:chOff x="0" y="0"/>
+          <a:chExt cx="0" cy="0"/>
+        </a:xfrm>
+      </p:grpSpPr>
+      <p:sp>
+        <p:nvSpPr>
+          <p:cNvPr id="2" name="Slide Image Placeholder 1"/>
+          <p:cNvSpPr>
+            <a:spLocks noGrp="1" noRot="1" noChangeAspect="1"/>
+          </p:cNvSpPr>
+          <p:nvPr>
+            <p:ph type="sldImg"/>
+          </p:nvPr>
+        </p:nvSpPr>
+        <p:spPr/>
+      </p:sp>
+      <p:sp>
+        <p:nvSpPr>
+          <p:cNvPr id="3" name="Notes Placeholder 2"/>
+          <p:cNvSpPr>
+            <a:spLocks noGrp="1"/>
+          </p:cNvSpPr>
+          <p:nvPr>
+            <p:ph type="body" idx="1"/>
+          </p:nvPr>
+        </p:nvSpPr>
+        <p:spPr/>
+        <p:txBody>
+          <a:bodyPr/>
+          <a:lstStyle/>
+          <a:p>
+            <a:r>
+              <a:rPr lang="en-GB" dirty="0"/>
+              <a:t>1. </a:t>
+            </a:r>
+            <a:r>
+              <a:rPr lang="en-GB" dirty="0" err="1"/>
+              <a:t>jeder</a:t>
+            </a:r>
+            <a:r>
+              <a:rPr lang="en-GB" dirty="0"/>
+              <a:t> </a:t>
+            </a:r>
+            <a:r>
+              <a:rPr lang="en-GB" dirty="0" err="1"/>
+              <a:t>Stellt</a:t>
+            </a:r>
+            <a:r>
+              <a:rPr lang="en-GB" dirty="0"/>
+              <a:t> </a:t>
+            </a:r>
+            <a:r>
+              <a:rPr lang="en-GB" dirty="0" err="1"/>
+              <a:t>sich</a:t>
+            </a:r>
+            <a:r>
+              <a:rPr lang="en-GB" dirty="0"/>
+              <a:t> </a:t>
+            </a:r>
+            <a:r>
+              <a:rPr lang="en-GB" dirty="0" err="1"/>
+              <a:t>vor</a:t>
+            </a:r>
+            <a:r>
+              <a:rPr lang="en-GB" dirty="0"/>
+              <a:t> </a:t>
+            </a:r>
+            <a:r>
+              <a:rPr lang="en-GB" dirty="0" err="1"/>
+              <a:t>mit</a:t>
+            </a:r>
+            <a:r>
+              <a:rPr lang="en-GB" dirty="0"/>
+              <a:t> </a:t>
+            </a:r>
+            <a:r>
+              <a:rPr lang="en-GB" dirty="0" err="1"/>
+              <a:t>Studiengang</a:t>
+            </a:r>
+            <a:r>
+              <a:rPr lang="en-GB" dirty="0"/>
+              <a:t>, Motivation und was er </a:t>
+            </a:r>
+            <a:r>
+              <a:rPr lang="en-GB" dirty="0" err="1"/>
+              <a:t>sonst</a:t>
+            </a:r>
+            <a:r>
+              <a:rPr lang="en-GB" dirty="0"/>
+              <a:t> noch </a:t>
+            </a:r>
+            <a:r>
+              <a:rPr lang="en-GB" dirty="0" err="1"/>
+              <a:t>sagen</a:t>
+            </a:r>
+            <a:r>
+              <a:rPr lang="en-GB" dirty="0"/>
+              <a:t> </a:t>
+            </a:r>
+            <a:r>
+              <a:rPr lang="en-GB" dirty="0" err="1"/>
+              <a:t>möchte</a:t>
+            </a:r>
+            <a:endParaRPr lang="en-GB" dirty="0"/>
+          </a:p>
+          <a:p>
+            <a:r>
+              <a:rPr lang="en-GB" dirty="0"/>
+              <a:t>2. </a:t>
+            </a:r>
+            <a:r>
+              <a:rPr lang="en-GB" dirty="0" err="1"/>
+              <a:t>Frage</a:t>
+            </a:r>
+            <a:r>
+              <a:rPr lang="en-GB" dirty="0"/>
+              <a:t>: </a:t>
+            </a:r>
+            <a:r>
+              <a:rPr lang="en-GB" dirty="0" err="1"/>
+              <a:t>Wer</a:t>
+            </a:r>
+            <a:r>
+              <a:rPr lang="en-GB" dirty="0"/>
+              <a:t> hat </a:t>
+            </a:r>
+            <a:r>
+              <a:rPr lang="en-GB" dirty="0" err="1"/>
+              <a:t>schon</a:t>
+            </a:r>
+            <a:r>
+              <a:rPr lang="en-GB" dirty="0"/>
+              <a:t> mal </a:t>
+            </a:r>
+            <a:r>
+              <a:rPr lang="en-GB" dirty="0" err="1"/>
+              <a:t>Pogrammiert</a:t>
+            </a:r>
+            <a:endParaRPr lang="en-GB" dirty="0"/>
+          </a:p>
+          <a:p>
+            <a:r>
+              <a:rPr lang="en-GB" dirty="0"/>
+              <a:t>3. </a:t>
+            </a:r>
+            <a:r>
+              <a:rPr lang="en-GB" dirty="0" err="1"/>
+              <a:t>Wer</a:t>
+            </a:r>
+            <a:r>
+              <a:rPr lang="en-GB" dirty="0"/>
+              <a:t> </a:t>
+            </a:r>
+            <a:r>
+              <a:rPr lang="en-GB" dirty="0" err="1"/>
+              <a:t>kennt</a:t>
+            </a:r>
+            <a:r>
+              <a:rPr lang="en-GB" dirty="0"/>
+              <a:t> if else</a:t>
+            </a:r>
+          </a:p>
+          <a:p>
+            <a:r>
+              <a:rPr lang="en-GB" dirty="0"/>
+              <a:t>4. </a:t>
+            </a:r>
+            <a:r>
+              <a:rPr lang="en-GB" dirty="0" err="1"/>
+              <a:t>Wer</a:t>
+            </a:r>
+            <a:r>
+              <a:rPr lang="en-GB" dirty="0"/>
+              <a:t> </a:t>
+            </a:r>
+            <a:r>
+              <a:rPr lang="en-GB" dirty="0" err="1"/>
+              <a:t>kennt</a:t>
+            </a:r>
+            <a:r>
+              <a:rPr lang="en-GB" dirty="0"/>
+              <a:t> integer</a:t>
+            </a:r>
+          </a:p>
+          <a:p>
+            <a:r>
+              <a:rPr lang="en-GB" dirty="0"/>
+              <a:t>5. </a:t>
+            </a:r>
+            <a:r>
+              <a:rPr lang="en-GB" dirty="0" err="1"/>
+              <a:t>Wer</a:t>
+            </a:r>
+            <a:r>
+              <a:rPr lang="en-GB" dirty="0"/>
+              <a:t> </a:t>
+            </a:r>
+            <a:r>
+              <a:rPr lang="en-GB" dirty="0" err="1"/>
+              <a:t>kennt</a:t>
+            </a:r>
+            <a:r>
+              <a:rPr lang="en-GB" dirty="0"/>
+              <a:t> </a:t>
+            </a:r>
+            <a:r>
+              <a:rPr lang="en-GB" dirty="0" err="1"/>
+              <a:t>schleife</a:t>
+            </a:r>
+            <a:endParaRPr lang="en-GB" dirty="0"/>
+          </a:p>
+          <a:p>
+            <a:r>
+              <a:rPr lang="en-GB" dirty="0"/>
+              <a:t>6. </a:t>
+            </a:r>
+            <a:r>
+              <a:rPr lang="en-GB" dirty="0" err="1"/>
+              <a:t>Wer</a:t>
+            </a:r>
+            <a:r>
+              <a:rPr lang="en-GB" dirty="0"/>
+              <a:t> </a:t>
+            </a:r>
+            <a:r>
+              <a:rPr lang="en-GB" dirty="0" err="1"/>
+              <a:t>kennt</a:t>
+            </a:r>
+            <a:r>
+              <a:rPr lang="en-GB" dirty="0"/>
+              <a:t> </a:t>
+            </a:r>
+            <a:r>
+              <a:rPr lang="en-GB"/>
+              <a:t>Funktionen</a:t>
+            </a:r>
+            <a:endParaRPr lang="de-DE" dirty="0"/>
+          </a:p>
+        </p:txBody>
+      </p:sp>
+      <p:sp>
+        <p:nvSpPr>
+          <p:cNvPr id="4" name="Slide Number Placeholder 3"/>
+          <p:cNvSpPr>
+            <a:spLocks noGrp="1"/>
+          </p:cNvSpPr>
+          <p:nvPr>
+            <p:ph type="sldNum" sz="quarter" idx="5"/>
+          </p:nvPr>
+        </p:nvSpPr>
+        <p:spPr/>
+        <p:txBody>
+          <a:bodyPr/>
+          <a:lstStyle/>
+          <a:p>
+            <a:fld id="{8947F2EB-A273-4CA5-8E41-BC88C509E25D}" type="slidenum">
+              <a:rPr lang="de-DE" smtClean="0"/>
+              <a:t>2</a:t>
+            </a:fld>
+            <a:endParaRPr lang="de-DE"/>
+          </a:p>
+        </p:txBody>
+      </p:sp>
+    </p:spTree>
+    <p:extLst>
+      <p:ext uri="{BB962C8B-B14F-4D97-AF65-F5344CB8AC3E}">
+        <p14:creationId xmlns:p14="http://schemas.microsoft.com/office/powerpoint/2010/main" val="776491969"/>
+      </p:ext>
+    </p:extLst>
+  </p:cSld>
+  <p:clrMapOvr>
+    <a:masterClrMapping/>
+  </p:clrMapOvr>
+</p:notes>
+</file>
+
 <file path=ppt/slideLayouts/slideLayout1.xml><?xml version="1.0" encoding="utf-8"?>
 <p:sldLayout xmlns:a="http://schemas.openxmlformats.org/drawingml/2006/main" xmlns:r="http://schemas.openxmlformats.org/officeDocument/2006/relationships" xmlns:p="http://schemas.openxmlformats.org/presentationml/2006/main" preserve="1" userDrawn="1">
   <p:cSld name="Titelfolie">
@@ -1162,7 +1451,7 @@
             <a:fld id="{C05EE493-AD2E-4872-B2F6-8F12A747F0A5}" type="slidenum">
               <a:rPr lang="de-DE" smtClean="0"/>
               <a:pPr/>
-              <a:t>‹Nr.›</a:t>
+              <a:t>‹#›</a:t>
             </a:fld>
             <a:endParaRPr lang="de-DE" dirty="0"/>
           </a:p>
@@ -1394,7 +1683,7 @@
             <a:fld id="{C05EE493-AD2E-4872-B2F6-8F12A747F0A5}" type="slidenum">
               <a:rPr lang="de-DE" smtClean="0"/>
               <a:pPr/>
-              <a:t>‹Nr.›</a:t>
+              <a:t>‹#›</a:t>
             </a:fld>
             <a:endParaRPr lang="de-DE" dirty="0"/>
           </a:p>
@@ -1648,7 +1937,7 @@
             <a:fld id="{C05EE493-AD2E-4872-B2F6-8F12A747F0A5}" type="slidenum">
               <a:rPr lang="de-DE" smtClean="0"/>
               <a:pPr/>
-              <a:t>‹Nr.›</a:t>
+              <a:t>‹#›</a:t>
             </a:fld>
             <a:endParaRPr lang="de-DE" dirty="0"/>
           </a:p>
@@ -1973,7 +2262,7 @@
             <a:fld id="{C05EE493-AD2E-4872-B2F6-8F12A747F0A5}" type="slidenum">
               <a:rPr lang="de-DE" smtClean="0"/>
               <a:pPr/>
-              <a:t>‹Nr.›</a:t>
+              <a:t>‹#›</a:t>
             </a:fld>
             <a:endParaRPr lang="de-DE" dirty="0"/>
           </a:p>
@@ -2203,7 +2492,7 @@
             <a:fld id="{C05EE493-AD2E-4872-B2F6-8F12A747F0A5}" type="slidenum">
               <a:rPr lang="de-DE" smtClean="0"/>
               <a:pPr/>
-              <a:t>‹Nr.›</a:t>
+              <a:t>‹#›</a:t>
             </a:fld>
             <a:endParaRPr lang="de-DE" dirty="0"/>
           </a:p>
@@ -2549,7 +2838,7 @@
             <a:fld id="{C05EE493-AD2E-4872-B2F6-8F12A747F0A5}" type="slidenum">
               <a:rPr lang="de-DE" smtClean="0"/>
               <a:pPr/>
-              <a:t>‹Nr.›</a:t>
+              <a:t>‹#›</a:t>
             </a:fld>
             <a:endParaRPr lang="de-DE" dirty="0"/>
           </a:p>
@@ -2790,7 +3079,7 @@
             <a:fld id="{C05EE493-AD2E-4872-B2F6-8F12A747F0A5}" type="slidenum">
               <a:rPr lang="de-DE" smtClean="0"/>
               <a:pPr/>
-              <a:t>‹Nr.›</a:t>
+              <a:t>‹#›</a:t>
             </a:fld>
             <a:endParaRPr lang="de-DE" dirty="0"/>
           </a:p>
@@ -3156,7 +3445,7 @@
             <a:fld id="{C05EE493-AD2E-4872-B2F6-8F12A747F0A5}" type="slidenum">
               <a:rPr lang="de-DE" smtClean="0"/>
               <a:pPr/>
-              <a:t>‹Nr.›</a:t>
+              <a:t>‹#›</a:t>
             </a:fld>
             <a:endParaRPr lang="de-DE" dirty="0"/>
           </a:p>
@@ -3294,7 +3583,7 @@
             <a:fld id="{C05EE493-AD2E-4872-B2F6-8F12A747F0A5}" type="slidenum">
               <a:rPr lang="de-DE" smtClean="0"/>
               <a:pPr/>
-              <a:t>‹Nr.›</a:t>
+              <a:t>‹#›</a:t>
             </a:fld>
             <a:endParaRPr lang="de-DE" dirty="0"/>
           </a:p>
@@ -3646,7 +3935,7 @@
             <a:fld id="{C05EE493-AD2E-4872-B2F6-8F12A747F0A5}" type="slidenum">
               <a:rPr lang="de-DE" smtClean="0"/>
               <a:pPr/>
-              <a:t>‹Nr.›</a:t>
+              <a:t>‹#›</a:t>
             </a:fld>
             <a:endParaRPr lang="de-DE" dirty="0"/>
           </a:p>
@@ -3954,7 +4243,7 @@
             <a:fld id="{C05EE493-AD2E-4872-B2F6-8F12A747F0A5}" type="slidenum">
               <a:rPr lang="de-DE" smtClean="0"/>
               <a:pPr/>
-              <a:t>‹Nr.›</a:t>
+              <a:t>‹#›</a:t>
             </a:fld>
             <a:endParaRPr lang="de-DE" dirty="0"/>
           </a:p>
@@ -4320,7 +4609,7 @@
             <a:fld id="{C05EE493-AD2E-4872-B2F6-8F12A747F0A5}" type="slidenum">
               <a:rPr lang="de-DE" smtClean="0"/>
               <a:pPr/>
-              <a:t>‹Nr.›</a:t>
+              <a:t>‹#›</a:t>
             </a:fld>
             <a:endParaRPr lang="de-DE" dirty="0"/>
           </a:p>
@@ -5524,7 +5813,7 @@
           <p:nvPr/>
         </p:nvPicPr>
         <p:blipFill>
-          <a:blip r:embed="rId2">
+          <a:blip r:embed="rId3">
             <a:extLst>
               <a:ext uri="{28A0092B-C50C-407E-A947-70E740481C1C}">
                 <a14:useLocalDpi xmlns:a14="http://schemas.microsoft.com/office/drawing/2010/main" val="0"/>
@@ -5571,7 +5860,7 @@
           <p:nvPr/>
         </p:nvPicPr>
         <p:blipFill>
-          <a:blip r:embed="rId3" cstate="screen">
+          <a:blip r:embed="rId4" cstate="screen">
             <a:extLst>
               <a:ext uri="{28A0092B-C50C-407E-A947-70E740481C1C}">
                 <a14:useLocalDpi xmlns:a14="http://schemas.microsoft.com/office/drawing/2010/main" val="0"/>
@@ -5673,7 +5962,7 @@
           <p:nvPr/>
         </p:nvPicPr>
         <p:blipFill>
-          <a:blip r:embed="rId4" cstate="print">
+          <a:blip r:embed="rId5" cstate="print">
             <a:extLst>
               <a:ext uri="{28A0092B-C50C-407E-A947-70E740481C1C}">
                 <a14:useLocalDpi xmlns:a14="http://schemas.microsoft.com/office/drawing/2010/main" val="0"/>
@@ -7364,7 +7653,7 @@
                     <a:schemeClr val="tx1"/>
                   </a:solidFill>
                 </a:rPr>
-                <a:t> nicht einsehbar</a:t>
+                <a:t> teilweise nicht einsehbar</a:t>
               </a:r>
             </a:p>
             <a:p>
@@ -7700,7 +7989,7 @@
         <p:spPr>
           <a:xfrm>
             <a:off x="2195736" y="1377874"/>
-            <a:ext cx="3841119" cy="4102252"/>
+            <a:ext cx="3841119" cy="3131246"/>
           </a:xfrm>
           <a:prstGeom prst="roundRect">
             <a:avLst/>
@@ -7897,28 +8186,6 @@
               </a:rPr>
               <a:t> </a:t>
             </a:r>
-          </a:p>
-          <a:p>
-            <a:pPr marL="342900" indent="-342900">
-              <a:lnSpc>
-                <a:spcPct val="200000"/>
-              </a:lnSpc>
-              <a:buFont typeface="+mj-lt"/>
-              <a:buAutoNum type="arabicPeriod"/>
-            </a:pPr>
-            <a:r>
-              <a:rPr lang="en-US" dirty="0" err="1">
-                <a:solidFill>
-                  <a:schemeClr val="tx1"/>
-                </a:solidFill>
-              </a:rPr>
-              <a:t>Funktionen</a:t>
-            </a:r>
-            <a:endParaRPr lang="en-US" dirty="0">
-              <a:solidFill>
-                <a:schemeClr val="tx1"/>
-              </a:solidFill>
-            </a:endParaRPr>
           </a:p>
         </p:txBody>
       </p:sp>

</xml_diff>